<commit_message>
Update Background Material for ESS visualization exercises
</commit_message>
<xml_diff>
--- a/2_Slides_Literature/1_Intro/1- Einfuehrung.pptx
+++ b/2_Slides_Literature/1_Intro/1- Einfuehrung.pptx
@@ -172,14 +172,6 @@
     </p:ext>
   </p:extLst>
 </p:presentation>
-</file>
-
-<file path=ppt/revisionInfo.xml><?xml version="1.0" encoding="utf-8"?>
-<p1510:revInfo xmlns:a="http://schemas.openxmlformats.org/drawingml/2006/main" xmlns:r="http://schemas.openxmlformats.org/officeDocument/2006/relationships" xmlns:p1510="http://schemas.microsoft.com/office/powerpoint/2015/10/main">
-  <p1510:revLst>
-    <p1510:client id="{ED196408-5721-44D1-9BFC-0BEE6E59FC91}" v="12" dt="2022-04-25T13:17:11.213"/>
-  </p1510:revLst>
-</p1510:revInfo>
 </file>
 
 <file path=ppt/changesInfos/changesInfo1.xml><?xml version="1.0" encoding="utf-8"?>
@@ -612,6 +604,30 @@
           <pc:docMk/>
           <pc:sldMk cId="1527864762" sldId="420"/>
         </pc:sldMkLst>
+      </pc:sldChg>
+    </pc:docChg>
+  </pc:docChgLst>
+  <pc:docChgLst>
+    <pc:chgData name="C C" userId="58c016da926720ee" providerId="LiveId" clId="{6D3D00F4-B207-4726-950D-66517C1F6057}"/>
+    <pc:docChg chg="modSld">
+      <pc:chgData name="C C" userId="58c016da926720ee" providerId="LiveId" clId="{6D3D00F4-B207-4726-950D-66517C1F6057}" dt="2023-03-27T11:42:51.527" v="13" actId="20577"/>
+      <pc:docMkLst>
+        <pc:docMk/>
+      </pc:docMkLst>
+      <pc:sldChg chg="modSp mod">
+        <pc:chgData name="C C" userId="58c016da926720ee" providerId="LiveId" clId="{6D3D00F4-B207-4726-950D-66517C1F6057}" dt="2023-03-27T11:42:51.527" v="13" actId="20577"/>
+        <pc:sldMkLst>
+          <pc:docMk/>
+          <pc:sldMk cId="3393580242" sldId="393"/>
+        </pc:sldMkLst>
+        <pc:spChg chg="mod">
+          <ac:chgData name="C C" userId="58c016da926720ee" providerId="LiveId" clId="{6D3D00F4-B207-4726-950D-66517C1F6057}" dt="2023-03-27T11:42:51.527" v="13" actId="20577"/>
+          <ac:spMkLst>
+            <pc:docMk/>
+            <pc:sldMk cId="3393580242" sldId="393"/>
+            <ac:spMk id="3" creationId="{00000000-0000-0000-0000-000000000000}"/>
+          </ac:spMkLst>
+        </pc:spChg>
       </pc:sldChg>
     </pc:docChg>
   </pc:docChgLst>
@@ -7270,7 +7286,7 @@
             </a:pPr>
             <a:r>
               <a:rPr lang="de-DE" sz="2400" dirty="0"/>
-              <a:t>Sprechstunde: Montag 10-12 Uhr </a:t>
+              <a:t>Sprechstunde: Dienstag 12-14 Uhr </a:t>
             </a:r>
             <a:r>
               <a:rPr lang="en-US" sz="2400" dirty="0" err="1"/>

</xml_diff>